<commit_message>
Adding the title for th emain slides
</commit_message>
<xml_diff>
--- a/Guided Capstone/Guided Captstone Project Prsentation.pptx
+++ b/Guided Capstone/Guided Captstone Project Prsentation.pptx
@@ -5,14 +5,16 @@
     <p:sldMasterId id="2147483660" r:id="rId4"/>
   </p:sldMasterIdLst>
   <p:notesMasterIdLst>
-    <p:notesMasterId r:id="rId10"/>
+    <p:notesMasterId r:id="rId12"/>
   </p:notesMasterIdLst>
   <p:sldIdLst>
     <p:sldId id="280" r:id="rId5"/>
     <p:sldId id="283" r:id="rId6"/>
     <p:sldId id="259" r:id="rId7"/>
     <p:sldId id="284" r:id="rId8"/>
-    <p:sldId id="281" r:id="rId9"/>
+    <p:sldId id="285" r:id="rId9"/>
+    <p:sldId id="286" r:id="rId10"/>
+    <p:sldId id="281" r:id="rId11"/>
   </p:sldIdLst>
   <p:sldSz cx="12192000" cy="6858000"/>
   <p:notesSz cx="6858000" cy="9144000"/>
@@ -119,6 +121,58 @@
 </p:presentation>
 </file>
 
+<file path=ppt/revisionInfo.xml><?xml version="1.0" encoding="utf-8"?>
+<p1510:revInfo xmlns:a="http://schemas.openxmlformats.org/drawingml/2006/main" xmlns:r="http://schemas.openxmlformats.org/officeDocument/2006/relationships" xmlns:p1510="http://schemas.microsoft.com/office/powerpoint/2015/10/main">
+  <p1510:revLst>
+    <p1510:client id="{A3DB1C23-958E-440D-8F17-CEC9FDBF3842}" v="4" dt="2025-01-21T00:32:36.998"/>
+  </p1510:revLst>
+</p1510:revInfo>
+</file>
+
+<file path=ppt/changesInfos/changesInfo1.xml><?xml version="1.0" encoding="utf-8"?>
+<pc:chgInfo xmlns:a="http://schemas.openxmlformats.org/drawingml/2006/main" xmlns:r="http://schemas.openxmlformats.org/officeDocument/2006/relationships" xmlns:ac="http://schemas.microsoft.com/office/drawing/2013/main/command" xmlns:pc="http://schemas.microsoft.com/office/powerpoint/2013/main/command">
+  <pc:docChgLst>
+    <pc:chgData name="Bini Teklehaimanot" userId="b19ea2b96be4e73e" providerId="LiveId" clId="{A3DB1C23-958E-440D-8F17-CEC9FDBF3842}"/>
+    <pc:docChg chg="addSld modSld">
+      <pc:chgData name="Bini Teklehaimanot" userId="b19ea2b96be4e73e" providerId="LiveId" clId="{A3DB1C23-958E-440D-8F17-CEC9FDBF3842}" dt="2025-01-21T00:33:25.648" v="60" actId="207"/>
+      <pc:docMkLst>
+        <pc:docMk/>
+      </pc:docMkLst>
+      <pc:sldChg chg="modSp new mod setBg">
+        <pc:chgData name="Bini Teklehaimanot" userId="b19ea2b96be4e73e" providerId="LiveId" clId="{A3DB1C23-958E-440D-8F17-CEC9FDBF3842}" dt="2025-01-21T00:33:02.168" v="37" actId="207"/>
+        <pc:sldMkLst>
+          <pc:docMk/>
+          <pc:sldMk cId="672303376" sldId="285"/>
+        </pc:sldMkLst>
+        <pc:spChg chg="mod">
+          <ac:chgData name="Bini Teklehaimanot" userId="b19ea2b96be4e73e" providerId="LiveId" clId="{A3DB1C23-958E-440D-8F17-CEC9FDBF3842}" dt="2025-01-21T00:33:02.168" v="37" actId="207"/>
+          <ac:spMkLst>
+            <pc:docMk/>
+            <pc:sldMk cId="672303376" sldId="285"/>
+            <ac:spMk id="2" creationId="{D47B70D4-0179-3F13-B969-B224C6394C66}"/>
+          </ac:spMkLst>
+        </pc:spChg>
+      </pc:sldChg>
+      <pc:sldChg chg="modSp new mod setBg">
+        <pc:chgData name="Bini Teklehaimanot" userId="b19ea2b96be4e73e" providerId="LiveId" clId="{A3DB1C23-958E-440D-8F17-CEC9FDBF3842}" dt="2025-01-21T00:33:25.648" v="60" actId="207"/>
+        <pc:sldMkLst>
+          <pc:docMk/>
+          <pc:sldMk cId="3542684257" sldId="286"/>
+        </pc:sldMkLst>
+        <pc:spChg chg="mod">
+          <ac:chgData name="Bini Teklehaimanot" userId="b19ea2b96be4e73e" providerId="LiveId" clId="{A3DB1C23-958E-440D-8F17-CEC9FDBF3842}" dt="2025-01-21T00:33:25.648" v="60" actId="207"/>
+          <ac:spMkLst>
+            <pc:docMk/>
+            <pc:sldMk cId="3542684257" sldId="286"/>
+            <ac:spMk id="2" creationId="{CD2A2065-D546-AD33-1E8F-D977849C1468}"/>
+          </ac:spMkLst>
+        </pc:spChg>
+      </pc:sldChg>
+    </pc:docChg>
+  </pc:docChgLst>
+</pc:chgInfo>
+</file>
+
 <file path=ppt/diagrams/colors1.xml><?xml version="1.0" encoding="utf-8"?>
 <dgm:colorsDef xmlns:dgm="http://schemas.openxmlformats.org/drawingml/2006/diagram" xmlns:a="http://schemas.openxmlformats.org/drawingml/2006/main" uniqueId="urn:microsoft.com/office/officeart/2005/8/colors/colorful1">
   <dgm:title val=""/>
@@ -1881,7 +1935,7 @@
         <a:lstStyle/>
         <a:p>
           <a:r>
-            <a:rPr lang="en-US"/>
+            <a:rPr lang="en-US" dirty="0"/>
             <a:t>Modeling Results and Analysis</a:t>
           </a:r>
         </a:p>
@@ -1917,7 +1971,7 @@
         <a:lstStyle/>
         <a:p>
           <a:r>
-            <a:rPr lang="en-US"/>
+            <a:rPr lang="en-US" dirty="0"/>
             <a:t>Summary and Conclusion</a:t>
           </a:r>
         </a:p>
@@ -3254,7 +3308,7 @@
             <a:buNone/>
           </a:pPr>
           <a:r>
-            <a:rPr lang="en-US" sz="1700" kern="1200"/>
+            <a:rPr lang="en-US" sz="1700" kern="1200" dirty="0"/>
             <a:t>Modeling Results and Analysis</a:t>
           </a:r>
         </a:p>
@@ -3379,7 +3433,7 @@
             <a:buNone/>
           </a:pPr>
           <a:r>
-            <a:rPr lang="en-US" sz="1700" kern="1200"/>
+            <a:rPr lang="en-US" sz="1700" kern="1200" dirty="0"/>
             <a:t>Summary and Conclusion</a:t>
           </a:r>
         </a:p>
@@ -7142,6 +7196,90 @@
 </p:notes>
 </file>
 
+<file path=ppt/notesSlides/notesSlide4.xml><?xml version="1.0" encoding="utf-8"?>
+<p:notes xmlns:a="http://schemas.openxmlformats.org/drawingml/2006/main" xmlns:r="http://schemas.openxmlformats.org/officeDocument/2006/relationships" xmlns:p="http://schemas.openxmlformats.org/presentationml/2006/main">
+  <p:cSld>
+    <p:spTree>
+      <p:nvGrpSpPr>
+        <p:cNvPr id="1" name=""/>
+        <p:cNvGrpSpPr/>
+        <p:nvPr/>
+      </p:nvGrpSpPr>
+      <p:grpSpPr>
+        <a:xfrm>
+          <a:off x="0" y="0"/>
+          <a:ext cx="0" cy="0"/>
+          <a:chOff x="0" y="0"/>
+          <a:chExt cx="0" cy="0"/>
+        </a:xfrm>
+      </p:grpSpPr>
+      <p:sp>
+        <p:nvSpPr>
+          <p:cNvPr id="2" name="Slide Image Placeholder 1"/>
+          <p:cNvSpPr>
+            <a:spLocks noGrp="1" noRot="1" noChangeAspect="1"/>
+          </p:cNvSpPr>
+          <p:nvPr>
+            <p:ph type="sldImg"/>
+          </p:nvPr>
+        </p:nvSpPr>
+        <p:spPr/>
+      </p:sp>
+      <p:sp>
+        <p:nvSpPr>
+          <p:cNvPr id="3" name="Notes Placeholder 2"/>
+          <p:cNvSpPr>
+            <a:spLocks noGrp="1"/>
+          </p:cNvSpPr>
+          <p:nvPr>
+            <p:ph type="body" idx="1"/>
+          </p:nvPr>
+        </p:nvSpPr>
+        <p:spPr/>
+        <p:txBody>
+          <a:bodyPr/>
+          <a:lstStyle/>
+          <a:p>
+            <a:endParaRPr lang="en-US" dirty="0"/>
+          </a:p>
+        </p:txBody>
+      </p:sp>
+      <p:sp>
+        <p:nvSpPr>
+          <p:cNvPr id="4" name="Slide Number Placeholder 3"/>
+          <p:cNvSpPr>
+            <a:spLocks noGrp="1"/>
+          </p:cNvSpPr>
+          <p:nvPr>
+            <p:ph type="sldNum" sz="quarter" idx="5"/>
+          </p:nvPr>
+        </p:nvSpPr>
+        <p:spPr/>
+        <p:txBody>
+          <a:bodyPr/>
+          <a:lstStyle/>
+          <a:p>
+            <a:fld id="{9BD0D263-FCA1-4F2F-ADC8-DAAD73AEB38A}" type="slidenum">
+              <a:rPr lang="en-US" smtClean="0"/>
+              <a:t>6</a:t>
+            </a:fld>
+            <a:endParaRPr lang="en-US"/>
+          </a:p>
+        </p:txBody>
+      </p:sp>
+    </p:spTree>
+    <p:extLst>
+      <p:ext uri="{BB962C8B-B14F-4D97-AF65-F5344CB8AC3E}">
+        <p14:creationId xmlns:p14="http://schemas.microsoft.com/office/powerpoint/2010/main" val="1100149519"/>
+      </p:ext>
+    </p:extLst>
+  </p:cSld>
+  <p:clrMapOvr>
+    <a:masterClrMapping/>
+  </p:clrMapOvr>
+</p:notes>
+</file>
+
 <file path=ppt/slideLayouts/slideLayout1.xml><?xml version="1.0" encoding="utf-8"?>
 <p:sldLayout xmlns:a="http://schemas.openxmlformats.org/drawingml/2006/main" xmlns:r="http://schemas.openxmlformats.org/officeDocument/2006/relationships" xmlns:p="http://schemas.openxmlformats.org/presentationml/2006/main" type="title" preserve="1">
   <p:cSld name="Title Slide">
@@ -13008,7 +13146,7 @@
           </a:effectLst>
           <a:extLst>
             <a:ext uri="{91240B29-F687-4f45-9708-019B960494DF}">
-              <a14:hiddenLine xmlns:a16="http://schemas.microsoft.com/office/drawing/2014/main" xmlns:p14="http://schemas.microsoft.com/office/powerpoint/2010/main" xmlns:a14="http://schemas.microsoft.com/office/drawing/2010/main" xmlns="" w="9525">
+              <a14:hiddenLine xmlns="" xmlns:a14="http://schemas.microsoft.com/office/drawing/2010/main" xmlns:p14="http://schemas.microsoft.com/office/powerpoint/2010/main" xmlns:a16="http://schemas.microsoft.com/office/drawing/2014/main" w="9525">
                 <a:solidFill>
                   <a:srgbClr val="000000"/>
                 </a:solidFill>
@@ -13428,7 +13566,7 @@
           </a:effectLst>
           <a:extLst>
             <a:ext uri="{91240B29-F687-4f45-9708-019B960494DF}">
-              <a14:hiddenLine xmlns="" xmlns:a14="http://schemas.microsoft.com/office/drawing/2010/main" xmlns:p14="http://schemas.microsoft.com/office/powerpoint/2010/main" xmlns:a16="http://schemas.microsoft.com/office/drawing/2014/main" xmlns:dgm="http://schemas.openxmlformats.org/drawingml/2006/diagram" w="9525">
+              <a14:hiddenLine xmlns:dgm="http://schemas.openxmlformats.org/drawingml/2006/diagram" xmlns:a16="http://schemas.microsoft.com/office/drawing/2014/main" xmlns:p14="http://schemas.microsoft.com/office/powerpoint/2010/main" xmlns:a14="http://schemas.microsoft.com/office/drawing/2010/main" xmlns="" w="9525">
                 <a:solidFill>
                   <a:srgbClr val="000000"/>
                 </a:solidFill>
@@ -13832,6 +13970,196 @@
 </file>
 
 <file path=ppt/slides/slide5.xml><?xml version="1.0" encoding="utf-8"?>
+<p:sld xmlns:a="http://schemas.openxmlformats.org/drawingml/2006/main" xmlns:r="http://schemas.openxmlformats.org/officeDocument/2006/relationships" xmlns:p="http://schemas.openxmlformats.org/presentationml/2006/main">
+  <p:cSld>
+    <p:bg>
+      <p:bgPr>
+        <a:solidFill>
+          <a:schemeClr val="accent4"/>
+        </a:solidFill>
+        <a:effectLst/>
+      </p:bgPr>
+    </p:bg>
+    <p:spTree>
+      <p:nvGrpSpPr>
+        <p:cNvPr id="1" name=""/>
+        <p:cNvGrpSpPr/>
+        <p:nvPr/>
+      </p:nvGrpSpPr>
+      <p:grpSpPr>
+        <a:xfrm>
+          <a:off x="0" y="0"/>
+          <a:ext cx="0" cy="0"/>
+          <a:chOff x="0" y="0"/>
+          <a:chExt cx="0" cy="0"/>
+        </a:xfrm>
+      </p:grpSpPr>
+      <p:sp>
+        <p:nvSpPr>
+          <p:cNvPr id="2" name="Title 1">
+            <a:extLst>
+              <a:ext uri="{FF2B5EF4-FFF2-40B4-BE49-F238E27FC236}">
+                <a16:creationId xmlns:a16="http://schemas.microsoft.com/office/drawing/2014/main" id="{D47B70D4-0179-3F13-B969-B224C6394C66}"/>
+              </a:ext>
+            </a:extLst>
+          </p:cNvPr>
+          <p:cNvSpPr>
+            <a:spLocks noGrp="1"/>
+          </p:cNvSpPr>
+          <p:nvPr>
+            <p:ph type="title"/>
+          </p:nvPr>
+        </p:nvSpPr>
+        <p:spPr/>
+        <p:txBody>
+          <a:bodyPr/>
+          <a:lstStyle/>
+          <a:p>
+            <a:r>
+              <a:rPr lang="en-US" dirty="0">
+                <a:solidFill>
+                  <a:schemeClr val="tx1"/>
+                </a:solidFill>
+              </a:rPr>
+              <a:t>Modeling Results and Analysis</a:t>
+            </a:r>
+          </a:p>
+        </p:txBody>
+      </p:sp>
+      <p:sp>
+        <p:nvSpPr>
+          <p:cNvPr id="3" name="Content Placeholder 2">
+            <a:extLst>
+              <a:ext uri="{FF2B5EF4-FFF2-40B4-BE49-F238E27FC236}">
+                <a16:creationId xmlns:a16="http://schemas.microsoft.com/office/drawing/2014/main" id="{6B0416B5-BC01-94B2-25BD-869436EF6C1C}"/>
+              </a:ext>
+            </a:extLst>
+          </p:cNvPr>
+          <p:cNvSpPr>
+            <a:spLocks noGrp="1"/>
+          </p:cNvSpPr>
+          <p:nvPr>
+            <p:ph idx="1"/>
+          </p:nvPr>
+        </p:nvSpPr>
+        <p:spPr/>
+        <p:txBody>
+          <a:bodyPr/>
+          <a:lstStyle/>
+          <a:p>
+            <a:endParaRPr lang="en-US" dirty="0"/>
+          </a:p>
+        </p:txBody>
+      </p:sp>
+    </p:spTree>
+    <p:extLst>
+      <p:ext uri="{BB962C8B-B14F-4D97-AF65-F5344CB8AC3E}">
+        <p14:creationId xmlns:p14="http://schemas.microsoft.com/office/powerpoint/2010/main" val="672303376"/>
+      </p:ext>
+    </p:extLst>
+  </p:cSld>
+  <p:clrMapOvr>
+    <a:masterClrMapping/>
+  </p:clrMapOvr>
+</p:sld>
+</file>
+
+<file path=ppt/slides/slide6.xml><?xml version="1.0" encoding="utf-8"?>
+<p:sld xmlns:a="http://schemas.openxmlformats.org/drawingml/2006/main" xmlns:r="http://schemas.openxmlformats.org/officeDocument/2006/relationships" xmlns:p="http://schemas.openxmlformats.org/presentationml/2006/main">
+  <p:cSld>
+    <p:bg>
+      <p:bgPr>
+        <a:solidFill>
+          <a:schemeClr val="accent5"/>
+        </a:solidFill>
+        <a:effectLst/>
+      </p:bgPr>
+    </p:bg>
+    <p:spTree>
+      <p:nvGrpSpPr>
+        <p:cNvPr id="1" name=""/>
+        <p:cNvGrpSpPr/>
+        <p:nvPr/>
+      </p:nvGrpSpPr>
+      <p:grpSpPr>
+        <a:xfrm>
+          <a:off x="0" y="0"/>
+          <a:ext cx="0" cy="0"/>
+          <a:chOff x="0" y="0"/>
+          <a:chExt cx="0" cy="0"/>
+        </a:xfrm>
+      </p:grpSpPr>
+      <p:sp>
+        <p:nvSpPr>
+          <p:cNvPr id="2" name="Title 1">
+            <a:extLst>
+              <a:ext uri="{FF2B5EF4-FFF2-40B4-BE49-F238E27FC236}">
+                <a16:creationId xmlns:a16="http://schemas.microsoft.com/office/drawing/2014/main" id="{CD2A2065-D546-AD33-1E8F-D977849C1468}"/>
+              </a:ext>
+            </a:extLst>
+          </p:cNvPr>
+          <p:cNvSpPr>
+            <a:spLocks noGrp="1"/>
+          </p:cNvSpPr>
+          <p:nvPr>
+            <p:ph type="title"/>
+          </p:nvPr>
+        </p:nvSpPr>
+        <p:spPr/>
+        <p:txBody>
+          <a:bodyPr/>
+          <a:lstStyle/>
+          <a:p>
+            <a:r>
+              <a:rPr lang="en-US" dirty="0">
+                <a:solidFill>
+                  <a:schemeClr val="tx1"/>
+                </a:solidFill>
+              </a:rPr>
+              <a:t>Summary and Conclusion</a:t>
+            </a:r>
+          </a:p>
+        </p:txBody>
+      </p:sp>
+      <p:sp>
+        <p:nvSpPr>
+          <p:cNvPr id="3" name="Content Placeholder 2">
+            <a:extLst>
+              <a:ext uri="{FF2B5EF4-FFF2-40B4-BE49-F238E27FC236}">
+                <a16:creationId xmlns:a16="http://schemas.microsoft.com/office/drawing/2014/main" id="{FDFACF6B-7D58-D5AE-0C79-5176030A2792}"/>
+              </a:ext>
+            </a:extLst>
+          </p:cNvPr>
+          <p:cNvSpPr>
+            <a:spLocks noGrp="1"/>
+          </p:cNvSpPr>
+          <p:nvPr>
+            <p:ph idx="1"/>
+          </p:nvPr>
+        </p:nvSpPr>
+        <p:spPr/>
+        <p:txBody>
+          <a:bodyPr/>
+          <a:lstStyle/>
+          <a:p>
+            <a:endParaRPr lang="en-US" dirty="0"/>
+          </a:p>
+        </p:txBody>
+      </p:sp>
+    </p:spTree>
+    <p:extLst>
+      <p:ext uri="{BB962C8B-B14F-4D97-AF65-F5344CB8AC3E}">
+        <p14:creationId xmlns:p14="http://schemas.microsoft.com/office/powerpoint/2010/main" val="3542684257"/>
+      </p:ext>
+    </p:extLst>
+  </p:cSld>
+  <p:clrMapOvr>
+    <a:masterClrMapping/>
+  </p:clrMapOvr>
+</p:sld>
+</file>
+
+<file path=ppt/slides/slide7.xml><?xml version="1.0" encoding="utf-8"?>
 <p:sld xmlns:a="http://schemas.openxmlformats.org/drawingml/2006/main" xmlns:r="http://schemas.openxmlformats.org/officeDocument/2006/relationships" xmlns:p="http://schemas.openxmlformats.org/presentationml/2006/main">
   <p:cSld>
     <p:bg>
@@ -14453,15 +14781,6 @@
 </file>
 
 <file path=customXml/item2.xml><?xml version="1.0" encoding="utf-8"?>
-<?mso-contentType ?>
-<FormTemplates xmlns="http://schemas.microsoft.com/sharepoint/v3/contenttype/forms">
-  <Display>DocumentLibraryForm</Display>
-  <Edit>DocumentLibraryForm</Edit>
-  <New>DocumentLibraryForm</New>
-</FormTemplates>
-</file>
-
-<file path=customXml/item3.xml><?xml version="1.0" encoding="utf-8"?>
 <ct:contentTypeSchema xmlns:ct="http://schemas.microsoft.com/office/2006/metadata/contentType" xmlns:ma="http://schemas.microsoft.com/office/2006/metadata/properties/metaAttributes" ct:_="" ma:_="" ma:contentTypeName="Document" ma:contentTypeID="0x01010079F111ED35F8CC479449609E8A0923A6" ma:contentTypeVersion="12" ma:contentTypeDescription="Create a new document." ma:contentTypeScope="" ma:versionID="a410dd7f93c95333ffa1b60ed6adedd1">
   <xsd:schema xmlns:xsd="http://www.w3.org/2001/XMLSchema" xmlns:xs="http://www.w3.org/2001/XMLSchema" xmlns:p="http://schemas.microsoft.com/office/2006/metadata/properties" xmlns:ns2="71af3243-3dd4-4a8d-8c0d-dd76da1f02a5" xmlns:ns3="16c05727-aa75-4e4a-9b5f-8a80a1165891" targetNamespace="http://schemas.microsoft.com/office/2006/metadata/properties" ma:root="true" ma:fieldsID="a936d9baba76aa3866493feff160faab" ns2:_="" ns3:_="">
     <xsd:import namespace="71af3243-3dd4-4a8d-8c0d-dd76da1f02a5"/>
@@ -14682,6 +15001,15 @@
 </ct:contentTypeSchema>
 </file>
 
+<file path=customXml/item3.xml><?xml version="1.0" encoding="utf-8"?>
+<?mso-contentType ?>
+<FormTemplates xmlns="http://schemas.microsoft.com/sharepoint/v3/contenttype/forms">
+  <Display>DocumentLibraryForm</Display>
+  <Edit>DocumentLibraryForm</Edit>
+  <New>DocumentLibraryForm</New>
+</FormTemplates>
+</file>
+
 <file path=customXml/itemProps1.xml><?xml version="1.0" encoding="utf-8"?>
 <ds:datastoreItem xmlns:ds="http://schemas.openxmlformats.org/officeDocument/2006/customXml" ds:itemID="{F7E70FC5-1855-47AB-8CE1-CB3C873A8988}">
   <ds:schemaRefs>
@@ -14693,14 +15021,6 @@
 </file>
 
 <file path=customXml/itemProps2.xml><?xml version="1.0" encoding="utf-8"?>
-<ds:datastoreItem xmlns:ds="http://schemas.openxmlformats.org/officeDocument/2006/customXml" ds:itemID="{30CB38EC-895A-4F8F-8F75-E263501ABB5A}">
-  <ds:schemaRefs>
-    <ds:schemaRef ds:uri="http://schemas.microsoft.com/sharepoint/v3/contenttype/forms"/>
-  </ds:schemaRefs>
-</ds:datastoreItem>
-</file>
-
-<file path=customXml/itemProps3.xml><?xml version="1.0" encoding="utf-8"?>
 <ds:datastoreItem xmlns:ds="http://schemas.openxmlformats.org/officeDocument/2006/customXml" ds:itemID="{5560E646-30AD-4BA0-97EA-A7A07DF5499A}">
   <ds:schemaRefs>
     <ds:schemaRef ds:uri="http://schemas.microsoft.com/office/2006/metadata/contentType"/>
@@ -14717,4 +15037,12 @@
     <ds:schemaRef ds:uri="http://schemas.microsoft.com/internal/obd"/>
   </ds:schemaRefs>
 </ds:datastoreItem>
+</file>
+
+<file path=customXml/itemProps3.xml><?xml version="1.0" encoding="utf-8"?>
+<ds:datastoreItem xmlns:ds="http://schemas.openxmlformats.org/officeDocument/2006/customXml" ds:itemID="{30CB38EC-895A-4F8F-8F75-E263501ABB5A}">
+  <ds:schemaRefs>
+    <ds:schemaRef ds:uri="http://schemas.microsoft.com/sharepoint/v3/contenttype/forms"/>
+  </ds:schemaRefs>
+</ds:datastoreItem>
 </file>
</xml_diff>